<commit_message>
change name in sqa doc
</commit_message>
<xml_diff>
--- a/doc/sqa/TEAL_SQA_Status_Dashboard.pptx
+++ b/doc/sqa/TEAL_SQA_Status_Dashboard.pptx
@@ -4364,12 +4364,8 @@
           <a:p>
             <a:pPr algn="ctr"/>
             <a:r>
-              <a:rPr lang="en-US" sz="2000" b="1" dirty="0" err="1"/>
-              <a:t>CashFlow</a:t>
-            </a:r>
-            <a:r>
               <a:rPr lang="en-US" sz="2000" b="1" dirty="0"/>
-              <a:t> RAVEN Plugin</a:t>
+              <a:t>TEAL RAVEN Plugin</a:t>
             </a:r>
           </a:p>
           <a:p>
@@ -6183,7 +6179,7 @@
         <p:spPr>
           <a:xfrm>
             <a:off x="1884358" y="5832381"/>
-            <a:ext cx="1702710" cy="707886"/>
+            <a:ext cx="1773242" cy="707886"/>
           </a:xfrm>
           <a:prstGeom prst="rect">
             <a:avLst/>
@@ -6209,11 +6205,11 @@
           <a:p>
             <a:r>
               <a:rPr lang="en-US" sz="1000" dirty="0"/>
-              <a:t>Technical Lead: Aaron </a:t>
-            </a:r>
-            <a:r>
-              <a:rPr lang="en-US" sz="1000" dirty="0" err="1"/>
-              <a:t>Epiney</a:t>
+              <a:t>Technical Lead: </a:t>
+            </a:r>
+            <a:r>
+              <a:rPr lang="en-US" sz="1000"/>
+              <a:t>Andrea Alfonsi</a:t>
             </a:r>
             <a:endParaRPr lang="en-US" sz="1000" dirty="0"/>
           </a:p>
@@ -6510,7 +6506,7 @@
           <a:p>
             <a:pPr algn="ctr"/>
             <a:r>
-              <a:rPr lang="en-US" sz="900" b="1"/>
+              <a:rPr lang="en-US" sz="900" b="1" dirty="0"/>
               <a:t>TEAL</a:t>
             </a:r>
             <a:br>

</xml_diff>